<commit_message>
Signed-off-by: STUDENT Darragh M. Sweeney <Darragh.M.Sweeney@students.ittralee.ie>
</commit_message>
<xml_diff>
--- a/ExcelPowepoint/D_VerticesAndTriangles.pptx
+++ b/ExcelPowepoint/D_VerticesAndTriangles.pptx
@@ -107,6 +107,11 @@
       </a:defRPr>
     </a:lvl9pPr>
   </p:defaultTextStyle>
+  <p:extLst>
+    <p:ext uri="{EFAFB233-063F-42B5-8137-9DF3F51BA10A}">
+      <p15:sldGuideLst xmlns:p15="http://schemas.microsoft.com/office/powerpoint/2012/main"/>
+    </p:ext>
+  </p:extLst>
 </p:presentation>
 </file>
 
@@ -693,7 +698,7 @@
           <a:p>
             <a:fld id="{335A215F-9F7A-493B-A084-C44C8130E90A}" type="datetimeFigureOut">
               <a:rPr lang="en-IE" smtClean="0"/>
-              <a:t>13/09/2022</a:t>
+              <a:t>20/09/2022</a:t>
             </a:fld>
             <a:endParaRPr lang="en-IE"/>
           </a:p>
@@ -893,7 +898,7 @@
           <a:p>
             <a:fld id="{335A215F-9F7A-493B-A084-C44C8130E90A}" type="datetimeFigureOut">
               <a:rPr lang="en-IE" smtClean="0"/>
-              <a:t>13/09/2022</a:t>
+              <a:t>20/09/2022</a:t>
             </a:fld>
             <a:endParaRPr lang="en-IE"/>
           </a:p>
@@ -1103,7 +1108,7 @@
           <a:p>
             <a:fld id="{335A215F-9F7A-493B-A084-C44C8130E90A}" type="datetimeFigureOut">
               <a:rPr lang="en-IE" smtClean="0"/>
-              <a:t>13/09/2022</a:t>
+              <a:t>20/09/2022</a:t>
             </a:fld>
             <a:endParaRPr lang="en-IE"/>
           </a:p>
@@ -1303,7 +1308,7 @@
           <a:p>
             <a:fld id="{335A215F-9F7A-493B-A084-C44C8130E90A}" type="datetimeFigureOut">
               <a:rPr lang="en-IE" smtClean="0"/>
-              <a:t>13/09/2022</a:t>
+              <a:t>20/09/2022</a:t>
             </a:fld>
             <a:endParaRPr lang="en-IE"/>
           </a:p>
@@ -1579,7 +1584,7 @@
           <a:p>
             <a:fld id="{335A215F-9F7A-493B-A084-C44C8130E90A}" type="datetimeFigureOut">
               <a:rPr lang="en-IE" smtClean="0"/>
-              <a:t>13/09/2022</a:t>
+              <a:t>20/09/2022</a:t>
             </a:fld>
             <a:endParaRPr lang="en-IE"/>
           </a:p>
@@ -1847,7 +1852,7 @@
           <a:p>
             <a:fld id="{335A215F-9F7A-493B-A084-C44C8130E90A}" type="datetimeFigureOut">
               <a:rPr lang="en-IE" smtClean="0"/>
-              <a:t>13/09/2022</a:t>
+              <a:t>20/09/2022</a:t>
             </a:fld>
             <a:endParaRPr lang="en-IE"/>
           </a:p>
@@ -2262,7 +2267,7 @@
           <a:p>
             <a:fld id="{335A215F-9F7A-493B-A084-C44C8130E90A}" type="datetimeFigureOut">
               <a:rPr lang="en-IE" smtClean="0"/>
-              <a:t>13/09/2022</a:t>
+              <a:t>20/09/2022</a:t>
             </a:fld>
             <a:endParaRPr lang="en-IE"/>
           </a:p>
@@ -2404,7 +2409,7 @@
           <a:p>
             <a:fld id="{335A215F-9F7A-493B-A084-C44C8130E90A}" type="datetimeFigureOut">
               <a:rPr lang="en-IE" smtClean="0"/>
-              <a:t>13/09/2022</a:t>
+              <a:t>20/09/2022</a:t>
             </a:fld>
             <a:endParaRPr lang="en-IE"/>
           </a:p>
@@ -2517,7 +2522,7 @@
           <a:p>
             <a:fld id="{335A215F-9F7A-493B-A084-C44C8130E90A}" type="datetimeFigureOut">
               <a:rPr lang="en-IE" smtClean="0"/>
-              <a:t>13/09/2022</a:t>
+              <a:t>20/09/2022</a:t>
             </a:fld>
             <a:endParaRPr lang="en-IE"/>
           </a:p>
@@ -2830,7 +2835,7 @@
           <a:p>
             <a:fld id="{335A215F-9F7A-493B-A084-C44C8130E90A}" type="datetimeFigureOut">
               <a:rPr lang="en-IE" smtClean="0"/>
-              <a:t>13/09/2022</a:t>
+              <a:t>20/09/2022</a:t>
             </a:fld>
             <a:endParaRPr lang="en-IE"/>
           </a:p>
@@ -3119,7 +3124,7 @@
           <a:p>
             <a:fld id="{335A215F-9F7A-493B-A084-C44C8130E90A}" type="datetimeFigureOut">
               <a:rPr lang="en-IE" smtClean="0"/>
-              <a:t>13/09/2022</a:t>
+              <a:t>20/09/2022</a:t>
             </a:fld>
             <a:endParaRPr lang="en-IE"/>
           </a:p>
@@ -3362,7 +3367,7 @@
           <a:p>
             <a:fld id="{335A215F-9F7A-493B-A084-C44C8130E90A}" type="datetimeFigureOut">
               <a:rPr lang="en-IE" smtClean="0"/>
-              <a:t>13/09/2022</a:t>
+              <a:t>20/09/2022</a:t>
             </a:fld>
             <a:endParaRPr lang="en-IE"/>
           </a:p>
@@ -3809,8 +3814,8 @@
           </a:prstGeom>
         </p:spPr>
       </p:pic>
-      <mc:AlternateContent xmlns:mc="http://schemas.openxmlformats.org/markup-compatibility/2006">
-        <mc:Choice xmlns:p14="http://schemas.microsoft.com/office/powerpoint/2010/main" Requires="p14">
+      <mc:AlternateContent xmlns:mc="http://schemas.openxmlformats.org/markup-compatibility/2006" xmlns:p14="http://schemas.microsoft.com/office/powerpoint/2010/main">
+        <mc:Choice Requires="p14">
           <p:contentPart p14:bwMode="auto" r:id="rId3">
             <p14:nvContentPartPr>
               <p14:cNvPr id="23" name="Ink 22">
@@ -3829,7 +3834,7 @@
             </p14:xfrm>
           </p:contentPart>
         </mc:Choice>
-        <mc:Fallback>
+        <mc:Fallback xmlns="">
           <p:pic>
             <p:nvPicPr>
               <p:cNvPr id="23" name="Ink 22">
@@ -3860,8 +3865,8 @@
           </p:pic>
         </mc:Fallback>
       </mc:AlternateContent>
-      <mc:AlternateContent xmlns:mc="http://schemas.openxmlformats.org/markup-compatibility/2006">
-        <mc:Choice xmlns:p14="http://schemas.microsoft.com/office/powerpoint/2010/main" Requires="p14">
+      <mc:AlternateContent xmlns:mc="http://schemas.openxmlformats.org/markup-compatibility/2006" xmlns:p14="http://schemas.microsoft.com/office/powerpoint/2010/main">
+        <mc:Choice Requires="p14">
           <p:contentPart p14:bwMode="auto" r:id="rId5">
             <p14:nvContentPartPr>
               <p14:cNvPr id="24" name="Ink 23">
@@ -3880,7 +3885,7 @@
             </p14:xfrm>
           </p:contentPart>
         </mc:Choice>
-        <mc:Fallback>
+        <mc:Fallback xmlns="">
           <p:pic>
             <p:nvPicPr>
               <p:cNvPr id="24" name="Ink 23">
@@ -3911,8 +3916,8 @@
           </p:pic>
         </mc:Fallback>
       </mc:AlternateContent>
-      <mc:AlternateContent xmlns:mc="http://schemas.openxmlformats.org/markup-compatibility/2006">
-        <mc:Choice xmlns:p14="http://schemas.microsoft.com/office/powerpoint/2010/main" Requires="p14">
+      <mc:AlternateContent xmlns:mc="http://schemas.openxmlformats.org/markup-compatibility/2006" xmlns:p14="http://schemas.microsoft.com/office/powerpoint/2010/main">
+        <mc:Choice Requires="p14">
           <p:contentPart p14:bwMode="auto" r:id="rId7">
             <p14:nvContentPartPr>
               <p14:cNvPr id="25" name="Ink 24">
@@ -3931,7 +3936,7 @@
             </p14:xfrm>
           </p:contentPart>
         </mc:Choice>
-        <mc:Fallback>
+        <mc:Fallback xmlns="">
           <p:pic>
             <p:nvPicPr>
               <p:cNvPr id="25" name="Ink 24">
@@ -3962,8 +3967,8 @@
           </p:pic>
         </mc:Fallback>
       </mc:AlternateContent>
-      <mc:AlternateContent xmlns:mc="http://schemas.openxmlformats.org/markup-compatibility/2006">
-        <mc:Choice xmlns:p14="http://schemas.microsoft.com/office/powerpoint/2010/main" Requires="p14">
+      <mc:AlternateContent xmlns:mc="http://schemas.openxmlformats.org/markup-compatibility/2006" xmlns:p14="http://schemas.microsoft.com/office/powerpoint/2010/main">
+        <mc:Choice Requires="p14">
           <p:contentPart p14:bwMode="auto" r:id="rId9">
             <p14:nvContentPartPr>
               <p14:cNvPr id="26" name="Ink 25">
@@ -3982,7 +3987,7 @@
             </p14:xfrm>
           </p:contentPart>
         </mc:Choice>
-        <mc:Fallback>
+        <mc:Fallback xmlns="">
           <p:pic>
             <p:nvPicPr>
               <p:cNvPr id="26" name="Ink 25">
@@ -4013,8 +4018,8 @@
           </p:pic>
         </mc:Fallback>
       </mc:AlternateContent>
-      <mc:AlternateContent xmlns:mc="http://schemas.openxmlformats.org/markup-compatibility/2006">
-        <mc:Choice xmlns:p14="http://schemas.microsoft.com/office/powerpoint/2010/main" Requires="p14">
+      <mc:AlternateContent xmlns:mc="http://schemas.openxmlformats.org/markup-compatibility/2006" xmlns:p14="http://schemas.microsoft.com/office/powerpoint/2010/main">
+        <mc:Choice Requires="p14">
           <p:contentPart p14:bwMode="auto" r:id="rId11">
             <p14:nvContentPartPr>
               <p14:cNvPr id="27" name="Ink 26">
@@ -4033,7 +4038,7 @@
             </p14:xfrm>
           </p:contentPart>
         </mc:Choice>
-        <mc:Fallback>
+        <mc:Fallback xmlns="">
           <p:pic>
             <p:nvPicPr>
               <p:cNvPr id="27" name="Ink 26">
@@ -4064,8 +4069,8 @@
           </p:pic>
         </mc:Fallback>
       </mc:AlternateContent>
-      <mc:AlternateContent xmlns:mc="http://schemas.openxmlformats.org/markup-compatibility/2006">
-        <mc:Choice xmlns:p14="http://schemas.microsoft.com/office/powerpoint/2010/main" Requires="p14">
+      <mc:AlternateContent xmlns:mc="http://schemas.openxmlformats.org/markup-compatibility/2006" xmlns:p14="http://schemas.microsoft.com/office/powerpoint/2010/main">
+        <mc:Choice Requires="p14">
           <p:contentPart p14:bwMode="auto" r:id="rId13">
             <p14:nvContentPartPr>
               <p14:cNvPr id="28" name="Ink 27">
@@ -4084,7 +4089,7 @@
             </p14:xfrm>
           </p:contentPart>
         </mc:Choice>
-        <mc:Fallback>
+        <mc:Fallback xmlns="">
           <p:pic>
             <p:nvPicPr>
               <p:cNvPr id="28" name="Ink 27">
@@ -4115,8 +4120,8 @@
           </p:pic>
         </mc:Fallback>
       </mc:AlternateContent>
-      <mc:AlternateContent xmlns:mc="http://schemas.openxmlformats.org/markup-compatibility/2006">
-        <mc:Choice xmlns:p14="http://schemas.microsoft.com/office/powerpoint/2010/main" Requires="p14">
+      <mc:AlternateContent xmlns:mc="http://schemas.openxmlformats.org/markup-compatibility/2006" xmlns:p14="http://schemas.microsoft.com/office/powerpoint/2010/main">
+        <mc:Choice Requires="p14">
           <p:contentPart p14:bwMode="auto" r:id="rId15">
             <p14:nvContentPartPr>
               <p14:cNvPr id="29" name="Ink 28">
@@ -4135,7 +4140,7 @@
             </p14:xfrm>
           </p:contentPart>
         </mc:Choice>
-        <mc:Fallback>
+        <mc:Fallback xmlns="">
           <p:pic>
             <p:nvPicPr>
               <p:cNvPr id="29" name="Ink 28">
@@ -4166,8 +4171,8 @@
           </p:pic>
         </mc:Fallback>
       </mc:AlternateContent>
-      <mc:AlternateContent xmlns:mc="http://schemas.openxmlformats.org/markup-compatibility/2006">
-        <mc:Choice xmlns:p14="http://schemas.microsoft.com/office/powerpoint/2010/main" Requires="p14">
+      <mc:AlternateContent xmlns:mc="http://schemas.openxmlformats.org/markup-compatibility/2006" xmlns:p14="http://schemas.microsoft.com/office/powerpoint/2010/main">
+        <mc:Choice Requires="p14">
           <p:contentPart p14:bwMode="auto" r:id="rId17">
             <p14:nvContentPartPr>
               <p14:cNvPr id="30" name="Ink 29">
@@ -4186,7 +4191,7 @@
             </p14:xfrm>
           </p:contentPart>
         </mc:Choice>
-        <mc:Fallback>
+        <mc:Fallback xmlns="">
           <p:pic>
             <p:nvPicPr>
               <p:cNvPr id="30" name="Ink 29">
@@ -4217,8 +4222,8 @@
           </p:pic>
         </mc:Fallback>
       </mc:AlternateContent>
-      <mc:AlternateContent xmlns:mc="http://schemas.openxmlformats.org/markup-compatibility/2006">
-        <mc:Choice xmlns:p14="http://schemas.microsoft.com/office/powerpoint/2010/main" Requires="p14">
+      <mc:AlternateContent xmlns:mc="http://schemas.openxmlformats.org/markup-compatibility/2006" xmlns:p14="http://schemas.microsoft.com/office/powerpoint/2010/main">
+        <mc:Choice Requires="p14">
           <p:contentPart p14:bwMode="auto" r:id="rId19">
             <p14:nvContentPartPr>
               <p14:cNvPr id="31" name="Ink 30">
@@ -4237,7 +4242,7 @@
             </p14:xfrm>
           </p:contentPart>
         </mc:Choice>
-        <mc:Fallback>
+        <mc:Fallback xmlns="">
           <p:pic>
             <p:nvPicPr>
               <p:cNvPr id="31" name="Ink 30">
@@ -4268,8 +4273,8 @@
           </p:pic>
         </mc:Fallback>
       </mc:AlternateContent>
-      <mc:AlternateContent xmlns:mc="http://schemas.openxmlformats.org/markup-compatibility/2006">
-        <mc:Choice xmlns:p14="http://schemas.microsoft.com/office/powerpoint/2010/main" Requires="p14">
+      <mc:AlternateContent xmlns:mc="http://schemas.openxmlformats.org/markup-compatibility/2006" xmlns:p14="http://schemas.microsoft.com/office/powerpoint/2010/main">
+        <mc:Choice Requires="p14">
           <p:contentPart p14:bwMode="auto" r:id="rId21">
             <p14:nvContentPartPr>
               <p14:cNvPr id="32" name="Ink 31">
@@ -4288,7 +4293,7 @@
             </p14:xfrm>
           </p:contentPart>
         </mc:Choice>
-        <mc:Fallback>
+        <mc:Fallback xmlns="">
           <p:pic>
             <p:nvPicPr>
               <p:cNvPr id="32" name="Ink 31">
@@ -4319,8 +4324,8 @@
           </p:pic>
         </mc:Fallback>
       </mc:AlternateContent>
-      <mc:AlternateContent xmlns:mc="http://schemas.openxmlformats.org/markup-compatibility/2006">
-        <mc:Choice xmlns:p14="http://schemas.microsoft.com/office/powerpoint/2010/main" Requires="p14">
+      <mc:AlternateContent xmlns:mc="http://schemas.openxmlformats.org/markup-compatibility/2006" xmlns:p14="http://schemas.microsoft.com/office/powerpoint/2010/main">
+        <mc:Choice Requires="p14">
           <p:contentPart p14:bwMode="auto" r:id="rId23">
             <p14:nvContentPartPr>
               <p14:cNvPr id="33" name="Ink 32">
@@ -4339,7 +4344,7 @@
             </p14:xfrm>
           </p:contentPart>
         </mc:Choice>
-        <mc:Fallback>
+        <mc:Fallback xmlns="">
           <p:pic>
             <p:nvPicPr>
               <p:cNvPr id="33" name="Ink 32">
@@ -4370,8 +4375,8 @@
           </p:pic>
         </mc:Fallback>
       </mc:AlternateContent>
-      <mc:AlternateContent xmlns:mc="http://schemas.openxmlformats.org/markup-compatibility/2006">
-        <mc:Choice xmlns:p14="http://schemas.microsoft.com/office/powerpoint/2010/main" Requires="p14">
+      <mc:AlternateContent xmlns:mc="http://schemas.openxmlformats.org/markup-compatibility/2006" xmlns:p14="http://schemas.microsoft.com/office/powerpoint/2010/main">
+        <mc:Choice Requires="p14">
           <p:contentPart p14:bwMode="auto" r:id="rId25">
             <p14:nvContentPartPr>
               <p14:cNvPr id="34" name="Ink 33">
@@ -4390,7 +4395,7 @@
             </p14:xfrm>
           </p:contentPart>
         </mc:Choice>
-        <mc:Fallback>
+        <mc:Fallback xmlns="">
           <p:pic>
             <p:nvPicPr>
               <p:cNvPr id="34" name="Ink 33">
@@ -4421,8 +4426,8 @@
           </p:pic>
         </mc:Fallback>
       </mc:AlternateContent>
-      <mc:AlternateContent xmlns:mc="http://schemas.openxmlformats.org/markup-compatibility/2006">
-        <mc:Choice xmlns:p14="http://schemas.microsoft.com/office/powerpoint/2010/main" Requires="p14">
+      <mc:AlternateContent xmlns:mc="http://schemas.openxmlformats.org/markup-compatibility/2006" xmlns:p14="http://schemas.microsoft.com/office/powerpoint/2010/main">
+        <mc:Choice Requires="p14">
           <p:contentPart p14:bwMode="auto" r:id="rId27">
             <p14:nvContentPartPr>
               <p14:cNvPr id="35" name="Ink 34">
@@ -4441,7 +4446,7 @@
             </p14:xfrm>
           </p:contentPart>
         </mc:Choice>
-        <mc:Fallback>
+        <mc:Fallback xmlns="">
           <p:pic>
             <p:nvPicPr>
               <p:cNvPr id="35" name="Ink 34">
@@ -4472,8 +4477,8 @@
           </p:pic>
         </mc:Fallback>
       </mc:AlternateContent>
-      <mc:AlternateContent xmlns:mc="http://schemas.openxmlformats.org/markup-compatibility/2006">
-        <mc:Choice xmlns:p14="http://schemas.microsoft.com/office/powerpoint/2010/main" Requires="p14">
+      <mc:AlternateContent xmlns:mc="http://schemas.openxmlformats.org/markup-compatibility/2006" xmlns:p14="http://schemas.microsoft.com/office/powerpoint/2010/main">
+        <mc:Choice Requires="p14">
           <p:contentPart p14:bwMode="auto" r:id="rId29">
             <p14:nvContentPartPr>
               <p14:cNvPr id="36" name="Ink 35">
@@ -4492,7 +4497,7 @@
             </p14:xfrm>
           </p:contentPart>
         </mc:Choice>
-        <mc:Fallback>
+        <mc:Fallback xmlns="">
           <p:pic>
             <p:nvPicPr>
               <p:cNvPr id="36" name="Ink 35">
@@ -11411,7 +11416,7 @@
                   <a:srgbClr val="FF0000"/>
                 </a:solidFill>
               </a:rPr>
-              <a:t>14</a:t>
+              <a:t>12</a:t>
             </a:r>
           </a:p>
         </p:txBody>

</xml_diff>